<commit_message>
unzipped file, changed parameters
</commit_message>
<xml_diff>
--- a/docs/Research presentation_10_13_23.pptx
+++ b/docs/Research presentation_10_13_23.pptx
@@ -113,6 +113,11 @@
       </a:defRPr>
     </a:lvl9pPr>
   </p:defaultTextStyle>
+  <p:extLst>
+    <p:ext uri="{EFAFB233-063F-42B5-8137-9DF3F51BA10A}">
+      <p15:sldGuideLst xmlns:p15="http://schemas.microsoft.com/office/powerpoint/2012/main"/>
+    </p:ext>
+  </p:extLst>
 </p:presentation>
 </file>
 
@@ -263,7 +268,7 @@
           <a:p>
             <a:fld id="{4A83D585-8E35-4B00-8471-1CAEF002BDC9}" type="datetimeFigureOut">
               <a:rPr lang="en-US" smtClean="0"/>
-              <a:t>10/11/2023</a:t>
+              <a:t>11/30/2023</a:t>
             </a:fld>
             <a:endParaRPr lang="en-US"/>
           </a:p>
@@ -461,7 +466,7 @@
           <a:p>
             <a:fld id="{4A83D585-8E35-4B00-8471-1CAEF002BDC9}" type="datetimeFigureOut">
               <a:rPr lang="en-US" smtClean="0"/>
-              <a:t>10/11/2023</a:t>
+              <a:t>11/30/2023</a:t>
             </a:fld>
             <a:endParaRPr lang="en-US"/>
           </a:p>
@@ -669,7 +674,7 @@
           <a:p>
             <a:fld id="{4A83D585-8E35-4B00-8471-1CAEF002BDC9}" type="datetimeFigureOut">
               <a:rPr lang="en-US" smtClean="0"/>
-              <a:t>10/11/2023</a:t>
+              <a:t>11/30/2023</a:t>
             </a:fld>
             <a:endParaRPr lang="en-US"/>
           </a:p>
@@ -867,7 +872,7 @@
           <a:p>
             <a:fld id="{4A83D585-8E35-4B00-8471-1CAEF002BDC9}" type="datetimeFigureOut">
               <a:rPr lang="en-US" smtClean="0"/>
-              <a:t>10/11/2023</a:t>
+              <a:t>11/30/2023</a:t>
             </a:fld>
             <a:endParaRPr lang="en-US"/>
           </a:p>
@@ -1142,7 +1147,7 @@
           <a:p>
             <a:fld id="{4A83D585-8E35-4B00-8471-1CAEF002BDC9}" type="datetimeFigureOut">
               <a:rPr lang="en-US" smtClean="0"/>
-              <a:t>10/11/2023</a:t>
+              <a:t>11/30/2023</a:t>
             </a:fld>
             <a:endParaRPr lang="en-US"/>
           </a:p>
@@ -1407,7 +1412,7 @@
           <a:p>
             <a:fld id="{4A83D585-8E35-4B00-8471-1CAEF002BDC9}" type="datetimeFigureOut">
               <a:rPr lang="en-US" smtClean="0"/>
-              <a:t>10/11/2023</a:t>
+              <a:t>11/30/2023</a:t>
             </a:fld>
             <a:endParaRPr lang="en-US"/>
           </a:p>
@@ -1819,7 +1824,7 @@
           <a:p>
             <a:fld id="{4A83D585-8E35-4B00-8471-1CAEF002BDC9}" type="datetimeFigureOut">
               <a:rPr lang="en-US" smtClean="0"/>
-              <a:t>10/11/2023</a:t>
+              <a:t>11/30/2023</a:t>
             </a:fld>
             <a:endParaRPr lang="en-US"/>
           </a:p>
@@ -1960,7 +1965,7 @@
           <a:p>
             <a:fld id="{4A83D585-8E35-4B00-8471-1CAEF002BDC9}" type="datetimeFigureOut">
               <a:rPr lang="en-US" smtClean="0"/>
-              <a:t>10/11/2023</a:t>
+              <a:t>11/30/2023</a:t>
             </a:fld>
             <a:endParaRPr lang="en-US"/>
           </a:p>
@@ -2073,7 +2078,7 @@
           <a:p>
             <a:fld id="{4A83D585-8E35-4B00-8471-1CAEF002BDC9}" type="datetimeFigureOut">
               <a:rPr lang="en-US" smtClean="0"/>
-              <a:t>10/11/2023</a:t>
+              <a:t>11/30/2023</a:t>
             </a:fld>
             <a:endParaRPr lang="en-US"/>
           </a:p>
@@ -2384,7 +2389,7 @@
           <a:p>
             <a:fld id="{4A83D585-8E35-4B00-8471-1CAEF002BDC9}" type="datetimeFigureOut">
               <a:rPr lang="en-US" smtClean="0"/>
-              <a:t>10/11/2023</a:t>
+              <a:t>11/30/2023</a:t>
             </a:fld>
             <a:endParaRPr lang="en-US"/>
           </a:p>
@@ -2672,7 +2677,7 @@
           <a:p>
             <a:fld id="{4A83D585-8E35-4B00-8471-1CAEF002BDC9}" type="datetimeFigureOut">
               <a:rPr lang="en-US" smtClean="0"/>
-              <a:t>10/11/2023</a:t>
+              <a:t>11/30/2023</a:t>
             </a:fld>
             <a:endParaRPr lang="en-US"/>
           </a:p>
@@ -2913,7 +2918,7 @@
           <a:p>
             <a:fld id="{4A83D585-8E35-4B00-8471-1CAEF002BDC9}" type="datetimeFigureOut">
               <a:rPr lang="en-US" smtClean="0"/>
-              <a:t>10/11/2023</a:t>
+              <a:t>11/30/2023</a:t>
             </a:fld>
             <a:endParaRPr lang="en-US"/>
           </a:p>

</xml_diff>